<commit_message>
[IMP] improve ppt presentation
</commit_message>
<xml_diff>
--- a/Presentation/intership.pptx
+++ b/Presentation/intership.pptx
@@ -8121,7 +8121,7 @@
                 <a:cs typeface="Arial"/>
                 <a:sym typeface="Arial"/>
               </a:rPr>
-              <a:t>Deveopment on demand</a:t>
+              <a:t>Development on demand</a:t>
             </a:r>
             <a:endParaRPr lang="en-IN" sz="3200" b="1" strike="noStrike">
               <a:solidFill>
@@ -8866,7 +8866,7 @@
                 <a:cs typeface="Arial"/>
                 <a:sym typeface="Arial"/>
               </a:rPr>
-              <a:t>As the name denotes, it is switching over from Odoo 13 to the latest Odoo 14. Keep in mind that it does not change the edition from community to enterprise editions, and it also does not cover the hosting type or migration from enterprise software to Odoo. </a:t>
+              <a:t>As the name denotes, it is switching over from Odoo 14 to the latest Odoo 16. Keep in mind that it does not change the edition from community to enterprise editions, and it also does not cover the hosting type or migration from enterprise software to Odoo. </a:t>
             </a:r>
             <a:endParaRPr lang="en-IN" sz="2400" b="1" strike="noStrike">
               <a:solidFill>
@@ -10385,7 +10385,7 @@
                 <a:cs typeface="Arial"/>
                 <a:sym typeface="Arial"/>
               </a:rPr>
-              <a:t>		</a:t>
+              <a:t>		 </a:t>
             </a:r>
             <a:r>
               <a:rPr lang="en-IN" sz="3600" b="1" strike="noStrike">
@@ -10528,6 +10528,34 @@
             </a:endParaRPr>
           </a:p>
           <a:p>
+            <a:pPr marL="0" marR="0" lvl="0" indent="0" algn="l" rtl="0">
+              <a:lnSpc>
+                <a:spcPct val="100000"/>
+              </a:lnSpc>
+              <a:spcBef>
+                <a:spcPts val="400"/>
+              </a:spcBef>
+              <a:spcAft>
+                <a:spcPts val="0"/>
+              </a:spcAft>
+              <a:buClr>
+                <a:srgbClr val="000000"/>
+              </a:buClr>
+              <a:buSzPts val="2000"/>
+              <a:buFont typeface="Arial" panose="02080604020202020204" pitchFamily="34" charset="0"/>
+              <a:buNone/>
+            </a:pPr>
+            <a:endParaRPr lang="en-IN" sz="2400" b="1" strike="noStrike">
+              <a:solidFill>
+                <a:schemeClr val="bg1"/>
+              </a:solidFill>
+              <a:latin typeface="Arial"/>
+              <a:ea typeface="Arial"/>
+              <a:cs typeface="Arial"/>
+              <a:sym typeface="Arial"/>
+            </a:endParaRPr>
+          </a:p>
+          <a:p>
             <a:pPr marL="342900" marR="0" lvl="0" indent="-342900" algn="l" rtl="0">
               <a:lnSpc>
                 <a:spcPct val="100000"/>
@@ -10716,7 +10744,7 @@
             </a:endParaRPr>
           </a:p>
           <a:p>
-            <a:pPr marL="342900" marR="0" lvl="0" indent="-342900" algn="l" rtl="0">
+            <a:pPr marL="0" marR="0" lvl="0" indent="0" algn="l" rtl="0">
               <a:lnSpc>
                 <a:spcPct val="100000"/>
               </a:lnSpc>
@@ -10731,20 +10759,8 @@
               </a:buClr>
               <a:buSzPts val="2000"/>
               <a:buFont typeface="Arial" panose="02080604020202020204" pitchFamily="34" charset="0"/>
-              <a:buChar char="•"/>
-            </a:pPr>
-            <a:r>
-              <a:rPr lang="en-IN" sz="2400" b="1" strike="noStrike">
-                <a:solidFill>
-                  <a:schemeClr val="tx1"/>
-                </a:solidFill>
-                <a:latin typeface="Arial"/>
-                <a:ea typeface="Arial"/>
-                <a:cs typeface="Arial"/>
-                <a:sym typeface="Arial"/>
-              </a:rPr>
-              <a:t></a:t>
-            </a:r>
+              <a:buNone/>
+            </a:pPr>
             <a:endParaRPr lang="en-IN" sz="2400" b="1" strike="noStrike">
               <a:solidFill>
                 <a:schemeClr val="tx1"/>
@@ -10940,7 +10956,7 @@
             <a:r>
               <a:rPr lang="en-IN" sz="2400" b="1" strike="noStrike">
                 <a:solidFill>
-                  <a:schemeClr val="tx1"/>
+                  <a:schemeClr val="bg1"/>
                 </a:solidFill>
                 <a:latin typeface="Arial"/>
                 <a:ea typeface="Arial"/>
@@ -10951,7 +10967,7 @@
             </a:r>
             <a:endParaRPr lang="en-IN" sz="2400" b="1" strike="noStrike">
               <a:solidFill>
-                <a:schemeClr val="tx1"/>
+                <a:schemeClr val="bg1"/>
               </a:solidFill>
               <a:latin typeface="Arial"/>
               <a:ea typeface="Arial"/>
@@ -11076,7 +11092,7 @@
             <a:r>
               <a:rPr lang="en-IN" sz="2400" b="1" strike="noStrike">
                 <a:solidFill>
-                  <a:schemeClr val="tx1"/>
+                  <a:schemeClr val="bg1"/>
                 </a:solidFill>
                 <a:latin typeface="Arial"/>
                 <a:ea typeface="Arial"/>
@@ -11087,7 +11103,7 @@
             </a:r>
             <a:endParaRPr lang="en-IN" sz="2400" b="1" strike="noStrike">
               <a:solidFill>
-                <a:schemeClr val="tx1"/>
+                <a:schemeClr val="bg1"/>
               </a:solidFill>
               <a:latin typeface="Arial"/>
               <a:ea typeface="Arial"/>
@@ -11212,7 +11228,7 @@
             <a:r>
               <a:rPr lang="en-IN" sz="2400" b="1" strike="noStrike">
                 <a:solidFill>
-                  <a:schemeClr val="tx1"/>
+                  <a:schemeClr val="bg1"/>
                 </a:solidFill>
                 <a:latin typeface="Arial"/>
                 <a:ea typeface="Arial"/>
@@ -11223,7 +11239,7 @@
             </a:r>
             <a:endParaRPr lang="en-IN" sz="2400" b="1" strike="noStrike">
               <a:solidFill>
-                <a:schemeClr val="tx1"/>
+                <a:schemeClr val="bg1"/>
               </a:solidFill>
               <a:latin typeface="Arial"/>
               <a:ea typeface="Arial"/>
@@ -12949,7 +12965,47 @@
                 <a:cs typeface="Arial"/>
                 <a:sym typeface="Arial"/>
               </a:rPr>
-              <a:t>"Community" version: GNU Lesser General Public License v3; "Enterprise" version: Proprietary license</a:t>
+              <a:t>"Community" version: GNU Lesser General Public License v3; </a:t>
+            </a:r>
+            <a:endParaRPr lang="en-IN" sz="2100" b="1" i="0" u="none" strike="noStrike" cap="none">
+              <a:solidFill>
+                <a:srgbClr val="FFFFFE"/>
+              </a:solidFill>
+              <a:latin typeface="Arial"/>
+              <a:ea typeface="Arial"/>
+              <a:cs typeface="Arial"/>
+              <a:sym typeface="Arial"/>
+            </a:endParaRPr>
+          </a:p>
+          <a:p>
+            <a:pPr marL="742950" marR="0" lvl="1" indent="-285750" algn="l" rtl="0">
+              <a:lnSpc>
+                <a:spcPct val="100000"/>
+              </a:lnSpc>
+              <a:spcBef>
+                <a:spcPts val="420"/>
+              </a:spcBef>
+              <a:spcAft>
+                <a:spcPts val="0"/>
+              </a:spcAft>
+              <a:buClr>
+                <a:srgbClr val="000000"/>
+              </a:buClr>
+              <a:buSzPts val="2100"/>
+              <a:buFont typeface="Noto Sans Symbols"/>
+              <a:buChar char="−"/>
+            </a:pPr>
+            <a:r>
+              <a:rPr lang="en-IN" sz="2100" b="1" i="0" u="none" strike="noStrike" cap="none">
+                <a:solidFill>
+                  <a:srgbClr val="FFFFFE"/>
+                </a:solidFill>
+                <a:latin typeface="Arial"/>
+                <a:ea typeface="Arial"/>
+                <a:cs typeface="Arial"/>
+                <a:sym typeface="Arial"/>
+              </a:rPr>
+              <a:t>"Enterprise" version: Proprietary license</a:t>
             </a:r>
             <a:endParaRPr sz="2100" b="0" i="0" u="none" strike="noStrike" cap="none">
               <a:solidFill>

</xml_diff>